<commit_message>
ajout de l'executable et de la présentation 2
</commit_message>
<xml_diff>
--- a/presentation2.pptx
+++ b/presentation2.pptx
@@ -25,9 +25,9 @@
     <p:sldId id="349" r:id="rId16"/>
     <p:sldId id="380" r:id="rId17"/>
     <p:sldId id="381" r:id="rId18"/>
-    <p:sldId id="341" r:id="rId19"/>
-    <p:sldId id="342" r:id="rId20"/>
-    <p:sldId id="336" r:id="rId21"/>
+    <p:sldId id="386" r:id="rId19"/>
+    <p:sldId id="336" r:id="rId20"/>
+    <p:sldId id="341" r:id="rId21"/>
   </p:sldIdLst>
   <p:sldSz cx="9144000" cy="5143500" type="screen16x9"/>
   <p:notesSz cx="6858000" cy="9144000"/>
@@ -227,7 +227,7 @@
           <a:p>
             <a:fld id="{BD909028-EDE8-7244-8C0C-B621A4B8742D}" type="datetimeFigureOut">
               <a:rPr lang="en-US" smtClean="0"/>
-              <a:t>4/16/18</a:t>
+              <a:t>4/17/18</a:t>
             </a:fld>
             <a:endParaRPr lang="en-US"/>
           </a:p>
@@ -1270,7 +1270,7 @@
       </p:grpSpPr>
       <p:sp>
         <p:nvSpPr>
-          <p:cNvPr id="2" name="Slide Image Placeholder 1"/>
+          <p:cNvPr id="2" name="Espace réservé de l’image des diapositives 1"/>
           <p:cNvSpPr>
             <a:spLocks noGrp="1" noRot="1" noChangeAspect="1"/>
           </p:cNvSpPr>
@@ -1282,7 +1282,7 @@
       </p:sp>
       <p:sp>
         <p:nvSpPr>
-          <p:cNvPr id="3" name="Notes Placeholder 2"/>
+          <p:cNvPr id="3" name="Espace réservé des commentaires 2"/>
           <p:cNvSpPr>
             <a:spLocks noGrp="1"/>
           </p:cNvSpPr>
@@ -1295,13 +1295,13 @@
           <a:bodyPr/>
           <a:lstStyle/>
           <a:p>
-            <a:endParaRPr lang="en-US" baseline="0" dirty="0" smtClean="0"/>
-          </a:p>
-        </p:txBody>
-      </p:sp>
-      <p:sp>
-        <p:nvSpPr>
-          <p:cNvPr id="4" name="Slide Number Placeholder 3"/>
+            <a:endParaRPr lang="fr-FR" dirty="0"/>
+          </a:p>
+        </p:txBody>
+      </p:sp>
+      <p:sp>
+        <p:nvSpPr>
+          <p:cNvPr id="4" name="Espace réservé du numéro de diapositive 3"/>
           <p:cNvSpPr>
             <a:spLocks noGrp="1"/>
           </p:cNvSpPr>
@@ -1325,7 +1325,7 @@
     </p:spTree>
     <p:extLst>
       <p:ext uri="{BB962C8B-B14F-4D97-AF65-F5344CB8AC3E}">
-        <p14:creationId xmlns:p14="http://schemas.microsoft.com/office/powerpoint/2010/main" val="1855005561"/>
+        <p14:creationId xmlns:p14="http://schemas.microsoft.com/office/powerpoint/2010/main" val="923414698"/>
       </p:ext>
     </p:extLst>
   </p:cSld>
@@ -1400,7 +1400,7 @@
           <a:p>
             <a:fld id="{1A6D72BF-5085-C747-8DC0-69846DE0A0D5}" type="slidenum">
               <a:rPr lang="en-US" smtClean="0"/>
-              <a:t>19</a:t>
+              <a:t>20</a:t>
             </a:fld>
             <a:endParaRPr lang="en-US"/>
           </a:p>
@@ -1409,7 +1409,7 @@
     </p:spTree>
     <p:extLst>
       <p:ext uri="{BB962C8B-B14F-4D97-AF65-F5344CB8AC3E}">
-        <p14:creationId xmlns:p14="http://schemas.microsoft.com/office/powerpoint/2010/main" val="581200916"/>
+        <p14:creationId xmlns:p14="http://schemas.microsoft.com/office/powerpoint/2010/main" val="1855005561"/>
       </p:ext>
     </p:extLst>
   </p:cSld>
@@ -2312,7 +2312,7 @@
           <a:p>
             <a:fld id="{F1050F85-94B7-F249-B231-5B809826353C}" type="datetimeFigureOut">
               <a:rPr lang="en-US" smtClean="0"/>
-              <a:t>4/16/18</a:t>
+              <a:t>4/17/18</a:t>
             </a:fld>
             <a:endParaRPr lang="en-US"/>
           </a:p>
@@ -2577,7 +2577,7 @@
           <a:p>
             <a:fld id="{F1050F85-94B7-F249-B231-5B809826353C}" type="datetimeFigureOut">
               <a:rPr lang="en-US" smtClean="0"/>
-              <a:t>4/16/18</a:t>
+              <a:t>4/17/18</a:t>
             </a:fld>
             <a:endParaRPr lang="en-US"/>
           </a:p>
@@ -2752,7 +2752,7 @@
           <a:p>
             <a:fld id="{F1050F85-94B7-F249-B231-5B809826353C}" type="datetimeFigureOut">
               <a:rPr lang="en-US" smtClean="0"/>
-              <a:t>4/16/18</a:t>
+              <a:t>4/17/18</a:t>
             </a:fld>
             <a:endParaRPr lang="en-US"/>
           </a:p>
@@ -2917,7 +2917,7 @@
           <a:p>
             <a:fld id="{F1050F85-94B7-F249-B231-5B809826353C}" type="datetimeFigureOut">
               <a:rPr lang="en-US" smtClean="0"/>
-              <a:t>4/16/18</a:t>
+              <a:t>4/17/18</a:t>
             </a:fld>
             <a:endParaRPr lang="en-US"/>
           </a:p>
@@ -3166,7 +3166,7 @@
           <a:p>
             <a:fld id="{F1050F85-94B7-F249-B231-5B809826353C}" type="datetimeFigureOut">
               <a:rPr lang="en-US" smtClean="0"/>
-              <a:t>4/16/18</a:t>
+              <a:t>4/17/18</a:t>
             </a:fld>
             <a:endParaRPr lang="en-US"/>
           </a:p>
@@ -3449,7 +3449,7 @@
           <a:p>
             <a:fld id="{F1050F85-94B7-F249-B231-5B809826353C}" type="datetimeFigureOut">
               <a:rPr lang="en-US" smtClean="0"/>
-              <a:t>4/16/18</a:t>
+              <a:t>4/17/18</a:t>
             </a:fld>
             <a:endParaRPr lang="en-US"/>
           </a:p>
@@ -3888,7 +3888,7 @@
           <a:p>
             <a:fld id="{F1050F85-94B7-F249-B231-5B809826353C}" type="datetimeFigureOut">
               <a:rPr lang="en-US" smtClean="0"/>
-              <a:t>4/16/18</a:t>
+              <a:t>4/17/18</a:t>
             </a:fld>
             <a:endParaRPr lang="en-US"/>
           </a:p>
@@ -4001,7 +4001,7 @@
           <a:p>
             <a:fld id="{F1050F85-94B7-F249-B231-5B809826353C}" type="datetimeFigureOut">
               <a:rPr lang="en-US" smtClean="0"/>
-              <a:t>4/16/18</a:t>
+              <a:t>4/17/18</a:t>
             </a:fld>
             <a:endParaRPr lang="en-US"/>
           </a:p>
@@ -4091,7 +4091,7 @@
           <a:p>
             <a:fld id="{F1050F85-94B7-F249-B231-5B809826353C}" type="datetimeFigureOut">
               <a:rPr lang="en-US" smtClean="0"/>
-              <a:t>4/16/18</a:t>
+              <a:t>4/17/18</a:t>
             </a:fld>
             <a:endParaRPr lang="en-US"/>
           </a:p>
@@ -4333,7 +4333,7 @@
           <a:p>
             <a:fld id="{F1050F85-94B7-F249-B231-5B809826353C}" type="datetimeFigureOut">
               <a:rPr lang="en-US" smtClean="0"/>
-              <a:t>4/16/18</a:t>
+              <a:t>4/17/18</a:t>
             </a:fld>
             <a:endParaRPr lang="en-US"/>
           </a:p>
@@ -4627,7 +4627,7 @@
           <a:p>
             <a:fld id="{F1050F85-94B7-F249-B231-5B809826353C}" type="datetimeFigureOut">
               <a:rPr lang="en-US" smtClean="0"/>
-              <a:t>4/16/18</a:t>
+              <a:t>4/17/18</a:t>
             </a:fld>
             <a:endParaRPr lang="en-US"/>
           </a:p>
@@ -4921,7 +4921,7 @@
           <a:p>
             <a:fld id="{F1050F85-94B7-F249-B231-5B809826353C}" type="datetimeFigureOut">
               <a:rPr lang="en-US" smtClean="0"/>
-              <a:t>4/16/18</a:t>
+              <a:t>4/17/18</a:t>
             </a:fld>
             <a:endParaRPr lang="en-US"/>
           </a:p>
@@ -5976,7 +5976,6 @@
               <a:rPr lang="fr-FR" sz="1600" b="1" dirty="0" smtClean="0"/>
               <a:t>Le personnage du jeu</a:t>
             </a:r>
-            <a:endParaRPr lang="fr-FR" sz="1600" b="1" dirty="0" smtClean="0"/>
           </a:p>
           <a:p>
             <a:endParaRPr lang="fr-FR" sz="1600" b="1" dirty="0"/>
@@ -5990,15 +5989,7 @@
           <a:p>
             <a:r>
               <a:rPr lang="fr-FR" sz="1600" b="1" dirty="0" smtClean="0"/>
-              <a:t>course </a:t>
-            </a:r>
-            <a:r>
-              <a:rPr lang="fr-FR" sz="1600" b="1" dirty="0" smtClean="0"/>
-              <a:t>utilisée dans </a:t>
-            </a:r>
-            <a:r>
-              <a:rPr lang="fr-FR" sz="1600" b="1" dirty="0" smtClean="0"/>
-              <a:t>le jeu.</a:t>
+              <a:t>course utilisée dans le jeu.</a:t>
             </a:r>
             <a:endParaRPr lang="fr-CA" sz="1600" b="1" dirty="0" smtClean="0"/>
           </a:p>
@@ -6761,15 +6752,7 @@
                   <a:schemeClr val="bg1"/>
                 </a:solidFill>
               </a:rPr>
-              <a:t> techniques </a:t>
-            </a:r>
-            <a:r>
-              <a:rPr lang="en-US" sz="2800" u="sng" cap="all" dirty="0" smtClean="0">
-                <a:solidFill>
-                  <a:schemeClr val="bg1"/>
-                </a:solidFill>
-              </a:rPr>
-              <a:t>et </a:t>
+              <a:t> techniques et </a:t>
             </a:r>
             <a:r>
               <a:rPr lang="en-US" sz="2800" u="sng" cap="all" dirty="0" err="1" smtClean="0">
@@ -6893,15 +6876,7 @@
             </a:pPr>
             <a:r>
               <a:rPr lang="fr-CA" sz="1600" b="1" dirty="0" smtClean="0"/>
-              <a:t>Le fait d’avoir fait presque </a:t>
-            </a:r>
-            <a:r>
-              <a:rPr lang="fr-CA" sz="1600" b="1" dirty="0" smtClean="0"/>
-              <a:t>tout les </a:t>
-            </a:r>
-            <a:r>
-              <a:rPr lang="fr-CA" sz="1600" b="1" dirty="0" smtClean="0"/>
-              <a:t>modèles et les textures.</a:t>
+              <a:t>Le fait d’avoir fait presque tout les modèles et les textures.</a:t>
             </a:r>
             <a:endParaRPr lang="fr-FR" sz="1600" dirty="0"/>
           </a:p>
@@ -7152,23 +7127,7 @@
                   <a:schemeClr val="bg1"/>
                 </a:solidFill>
               </a:rPr>
-              <a:t>Les scripts utilisés pour le </a:t>
-            </a:r>
-            <a:r>
-              <a:rPr lang="fr-CA" sz="1400" dirty="0" smtClean="0">
-                <a:solidFill>
-                  <a:schemeClr val="bg1"/>
-                </a:solidFill>
-              </a:rPr>
-              <a:t>contrôle </a:t>
-            </a:r>
-            <a:r>
-              <a:rPr lang="fr-CA" sz="1400" dirty="0" smtClean="0">
-                <a:solidFill>
-                  <a:schemeClr val="bg1"/>
-                </a:solidFill>
-              </a:rPr>
-              <a:t>de la caméra et du personnage</a:t>
+              <a:t>Les scripts utilisés pour le contrôle de la caméra et du personnage</a:t>
             </a:r>
             <a:r>
               <a:rPr lang="fr-CA" sz="1400" dirty="0">
@@ -7215,23 +7174,7 @@
                   <a:schemeClr val="bg1"/>
                 </a:solidFill>
               </a:rPr>
-              <a:t>Avoir </a:t>
-            </a:r>
-            <a:r>
-              <a:rPr lang="fr-CA" sz="1400" dirty="0" smtClean="0">
-                <a:solidFill>
-                  <a:schemeClr val="bg1"/>
-                </a:solidFill>
-              </a:rPr>
-              <a:t>appris </a:t>
-            </a:r>
-            <a:r>
-              <a:rPr lang="fr-CA" sz="1400" dirty="0" smtClean="0">
-                <a:solidFill>
-                  <a:schemeClr val="bg1"/>
-                </a:solidFill>
-              </a:rPr>
-              <a:t>Blender, </a:t>
+              <a:t>Avoir appris Blender, </a:t>
             </a:r>
             <a:r>
               <a:rPr lang="fr-CA" sz="1400" dirty="0" err="1" smtClean="0">
@@ -7804,7 +7747,7 @@
       </p:grpSpPr>
       <p:sp>
         <p:nvSpPr>
-          <p:cNvPr id="5" name="Rectangle 4"/>
+          <p:cNvPr id="9" name="Rectangle 8"/>
           <p:cNvSpPr/>
           <p:nvPr/>
         </p:nvSpPr>
@@ -7850,125 +7793,709 @@
       </p:sp>
       <p:sp>
         <p:nvSpPr>
-          <p:cNvPr id="3" name="TextBox 2"/>
-          <p:cNvSpPr txBox="1"/>
+          <p:cNvPr id="3" name="Espace réservé du contenu 2"/>
+          <p:cNvSpPr>
+            <a:spLocks noGrp="1"/>
+          </p:cNvSpPr>
+          <p:nvPr>
+            <p:ph idx="1"/>
+          </p:nvPr>
+        </p:nvSpPr>
+        <p:spPr>
+          <a:xfrm>
+            <a:off x="505455" y="349431"/>
+            <a:ext cx="3304545" cy="645668"/>
+          </a:xfrm>
+        </p:spPr>
+        <p:txBody>
+          <a:bodyPr>
+            <a:noAutofit/>
+          </a:bodyPr>
+          <a:lstStyle/>
+          <a:p>
+            <a:pPr algn="ctr">
+              <a:lnSpc>
+                <a:spcPct val="150000"/>
+              </a:lnSpc>
+            </a:pPr>
+            <a:r>
+              <a:rPr lang="en-US" sz="2800" u="sng" cap="all" dirty="0" smtClean="0">
+                <a:solidFill>
+                  <a:schemeClr val="bg1"/>
+                </a:solidFill>
+              </a:rPr>
+              <a:t>Points forts</a:t>
+            </a:r>
+            <a:endParaRPr lang="en-US" sz="2800" u="sng" cap="all" dirty="0">
+              <a:solidFill>
+                <a:schemeClr val="bg1"/>
+              </a:solidFill>
+            </a:endParaRPr>
+          </a:p>
+        </p:txBody>
+      </p:sp>
+      <p:sp>
+        <p:nvSpPr>
+          <p:cNvPr id="5" name="Rectangle 4"/>
+          <p:cNvSpPr/>
           <p:nvPr/>
         </p:nvSpPr>
         <p:spPr>
           <a:xfrm>
-            <a:off x="3667113" y="2311917"/>
-            <a:ext cx="1796326" cy="584775"/>
+            <a:off x="0" y="1864633"/>
+            <a:ext cx="4485078" cy="2770866"/>
           </a:xfrm>
           <a:prstGeom prst="rect">
             <a:avLst/>
           </a:prstGeom>
-          <a:noFill/>
-        </p:spPr>
-        <p:txBody>
-          <a:bodyPr wrap="none" rtlCol="0">
-            <a:spAutoFit/>
-          </a:bodyPr>
-          <a:lstStyle/>
-          <a:p>
-            <a:pPr algn="ctr"/>
-            <a:r>
-              <a:rPr lang="fr-CA" sz="3200" dirty="0" smtClean="0">
-                <a:solidFill>
-                  <a:schemeClr val="bg1"/>
-                </a:solidFill>
-                <a:latin typeface="+mj-lt"/>
-              </a:rPr>
-              <a:t>MERCI!</a:t>
-            </a:r>
-            <a:endParaRPr lang="fr-CA" sz="3200" dirty="0">
-              <a:solidFill>
-                <a:schemeClr val="bg1"/>
-              </a:solidFill>
-              <a:latin typeface="+mj-lt"/>
-            </a:endParaRPr>
-          </a:p>
-        </p:txBody>
-      </p:sp>
-      <p:cxnSp>
-        <p:nvCxnSpPr>
-          <p:cNvPr id="7" name="Connecteur droit 6"/>
-          <p:cNvCxnSpPr/>
-          <p:nvPr/>
-        </p:nvCxnSpPr>
-        <p:spPr>
-          <a:xfrm>
-            <a:off x="1620456" y="1574157"/>
-            <a:ext cx="5729468" cy="0"/>
-          </a:xfrm>
-          <a:prstGeom prst="line">
-            <a:avLst/>
-          </a:prstGeom>
+          <a:solidFill>
+            <a:schemeClr val="accent5">
+              <a:lumMod val="40000"/>
+              <a:lumOff val="60000"/>
+            </a:schemeClr>
+          </a:solidFill>
           <a:ln>
-            <a:solidFill>
-              <a:schemeClr val="bg1"/>
-            </a:solidFill>
+            <a:noFill/>
           </a:ln>
         </p:spPr>
         <p:style>
-          <a:lnRef idx="1">
-            <a:schemeClr val="accent1"/>
+          <a:lnRef idx="2">
+            <a:schemeClr val="accent1">
+              <a:shade val="50000"/>
+            </a:schemeClr>
           </a:lnRef>
-          <a:fillRef idx="0">
+          <a:fillRef idx="1">
             <a:schemeClr val="accent1"/>
           </a:fillRef>
           <a:effectRef idx="0">
             <a:schemeClr val="accent1"/>
           </a:effectRef>
           <a:fontRef idx="minor">
-            <a:schemeClr val="tx1"/>
+            <a:schemeClr val="lt1"/>
           </a:fontRef>
         </p:style>
-      </p:cxnSp>
-      <p:cxnSp>
-        <p:nvCxnSpPr>
-          <p:cNvPr id="8" name="Connecteur droit 7"/>
-          <p:cNvCxnSpPr/>
+        <p:txBody>
+          <a:bodyPr rtlCol="0" anchor="ctr"/>
+          <a:lstStyle/>
+          <a:p>
+            <a:pPr algn="ctr"/>
+            <a:endParaRPr lang="fr-FR"/>
+          </a:p>
+        </p:txBody>
+      </p:sp>
+      <p:sp>
+        <p:nvSpPr>
+          <p:cNvPr id="6" name="ZoneTexte 5"/>
+          <p:cNvSpPr txBox="1"/>
           <p:nvPr/>
-        </p:nvCxnSpPr>
-        <p:spPr>
-          <a:xfrm>
-            <a:off x="1620456" y="3634452"/>
-            <a:ext cx="5729468" cy="0"/>
-          </a:xfrm>
-          <a:prstGeom prst="line">
+        </p:nvSpPr>
+        <p:spPr>
+          <a:xfrm>
+            <a:off x="688185" y="1992834"/>
+            <a:ext cx="3593940" cy="1938992"/>
+          </a:xfrm>
+          <a:prstGeom prst="rect">
             <a:avLst/>
           </a:prstGeom>
+          <a:noFill/>
+        </p:spPr>
+        <p:txBody>
+          <a:bodyPr wrap="square" rtlCol="0">
+            <a:spAutoFit/>
+          </a:bodyPr>
+          <a:lstStyle/>
+          <a:p>
+            <a:pPr marL="285750" indent="-285750">
+              <a:lnSpc>
+                <a:spcPct val="150000"/>
+              </a:lnSpc>
+              <a:buFont typeface="Arial" charset="0"/>
+              <a:buChar char="•"/>
+            </a:pPr>
+            <a:r>
+              <a:rPr lang="fr-CA" sz="1600" b="1" dirty="0"/>
+              <a:t>A</a:t>
+            </a:r>
+            <a:r>
+              <a:rPr lang="fr-CA" sz="1600" b="1" dirty="0" smtClean="0"/>
+              <a:t>nimation </a:t>
+            </a:r>
+            <a:r>
+              <a:rPr lang="fr-CA" sz="1600" b="1" dirty="0" smtClean="0"/>
+              <a:t>du personnage.</a:t>
+            </a:r>
+          </a:p>
+          <a:p>
+            <a:pPr marL="285750" indent="-285750">
+              <a:lnSpc>
+                <a:spcPct val="150000"/>
+              </a:lnSpc>
+              <a:buFont typeface="Arial" charset="0"/>
+              <a:buChar char="•"/>
+            </a:pPr>
+            <a:r>
+              <a:rPr lang="fr-CA" sz="1600" b="1" dirty="0" smtClean="0"/>
+              <a:t>Pas assez de modèles différents</a:t>
+            </a:r>
+          </a:p>
+          <a:p>
+            <a:pPr marL="285750" indent="-285750">
+              <a:lnSpc>
+                <a:spcPct val="150000"/>
+              </a:lnSpc>
+              <a:buFont typeface="Arial" charset="0"/>
+              <a:buChar char="•"/>
+            </a:pPr>
+            <a:r>
+              <a:rPr lang="fr-CA" sz="1600" b="1" dirty="0" smtClean="0"/>
+              <a:t>Mécanique simple</a:t>
+            </a:r>
+          </a:p>
+          <a:p>
+            <a:pPr marL="285750" indent="-285750">
+              <a:lnSpc>
+                <a:spcPct val="150000"/>
+              </a:lnSpc>
+              <a:buFont typeface="Arial" charset="0"/>
+              <a:buChar char="•"/>
+            </a:pPr>
+            <a:endParaRPr lang="fr-FR" sz="1600" dirty="0"/>
+          </a:p>
+        </p:txBody>
+      </p:sp>
+      <p:sp>
+        <p:nvSpPr>
+          <p:cNvPr id="7" name="Rectangle 6"/>
+          <p:cNvSpPr/>
+          <p:nvPr/>
+        </p:nvSpPr>
+        <p:spPr>
+          <a:xfrm>
+            <a:off x="4756036" y="1864632"/>
+            <a:ext cx="4387964" cy="2770867"/>
+          </a:xfrm>
+          <a:prstGeom prst="rect">
+            <a:avLst/>
+          </a:prstGeom>
+          <a:solidFill>
+            <a:schemeClr val="accent2"/>
+          </a:solidFill>
           <a:ln>
-            <a:solidFill>
-              <a:schemeClr val="bg1"/>
-            </a:solidFill>
+            <a:noFill/>
           </a:ln>
         </p:spPr>
         <p:style>
-          <a:lnRef idx="1">
-            <a:schemeClr val="accent1"/>
+          <a:lnRef idx="2">
+            <a:schemeClr val="accent1">
+              <a:shade val="50000"/>
+            </a:schemeClr>
           </a:lnRef>
-          <a:fillRef idx="0">
+          <a:fillRef idx="1">
             <a:schemeClr val="accent1"/>
           </a:fillRef>
           <a:effectRef idx="0">
             <a:schemeClr val="accent1"/>
           </a:effectRef>
           <a:fontRef idx="minor">
-            <a:schemeClr val="tx1"/>
+            <a:schemeClr val="lt1"/>
           </a:fontRef>
         </p:style>
-      </p:cxnSp>
+        <p:txBody>
+          <a:bodyPr rtlCol="0" anchor="ctr"/>
+          <a:lstStyle/>
+          <a:p>
+            <a:pPr algn="ctr"/>
+            <a:endParaRPr lang="fr-FR"/>
+          </a:p>
+        </p:txBody>
+      </p:sp>
+      <p:sp>
+        <p:nvSpPr>
+          <p:cNvPr id="8" name="Content Placeholder 2"/>
+          <p:cNvSpPr txBox="1">
+            <a:spLocks/>
+          </p:cNvSpPr>
+          <p:nvPr/>
+        </p:nvSpPr>
+        <p:spPr>
+          <a:xfrm>
+            <a:off x="5325401" y="1992834"/>
+            <a:ext cx="3547641" cy="2312466"/>
+          </a:xfrm>
+          <a:prstGeom prst="rect">
+            <a:avLst/>
+          </a:prstGeom>
+        </p:spPr>
+        <p:txBody>
+          <a:bodyPr vert="horz" lIns="91440" tIns="45720" rIns="91440" bIns="45720" rtlCol="0">
+            <a:noAutofit/>
+          </a:bodyPr>
+          <a:lstStyle>
+            <a:lvl1pPr marL="0" indent="0" algn="l" defTabSz="914400" rtl="0" eaLnBrk="1" latinLnBrk="0" hangingPunct="1">
+              <a:spcBef>
+                <a:spcPct val="20000"/>
+              </a:spcBef>
+              <a:spcAft>
+                <a:spcPts val="600"/>
+              </a:spcAft>
+              <a:buFont typeface="Arial" pitchFamily="34" charset="0"/>
+              <a:buNone/>
+              <a:defRPr sz="2000" b="1" kern="1200">
+                <a:solidFill>
+                  <a:schemeClr val="tx1"/>
+                </a:solidFill>
+                <a:latin typeface="+mn-lt"/>
+                <a:ea typeface="+mn-ea"/>
+                <a:cs typeface="+mn-cs"/>
+              </a:defRPr>
+            </a:lvl1pPr>
+            <a:lvl2pPr marL="457200" indent="-182880" algn="l" defTabSz="914400" rtl="0" eaLnBrk="1" latinLnBrk="0" hangingPunct="1">
+              <a:spcBef>
+                <a:spcPct val="20000"/>
+              </a:spcBef>
+              <a:buClr>
+                <a:schemeClr val="tx2"/>
+              </a:buClr>
+              <a:buFont typeface="Arial" pitchFamily="34" charset="0"/>
+              <a:buChar char="•"/>
+              <a:defRPr sz="2000" kern="1200">
+                <a:solidFill>
+                  <a:schemeClr val="tx1"/>
+                </a:solidFill>
+                <a:latin typeface="+mn-lt"/>
+                <a:ea typeface="+mn-ea"/>
+                <a:cs typeface="+mn-cs"/>
+              </a:defRPr>
+            </a:lvl2pPr>
+            <a:lvl3pPr marL="1143000" indent="-228600" algn="l" defTabSz="914400" rtl="0" eaLnBrk="1" latinLnBrk="0" hangingPunct="1">
+              <a:spcBef>
+                <a:spcPct val="20000"/>
+              </a:spcBef>
+              <a:buClr>
+                <a:schemeClr val="tx2"/>
+              </a:buClr>
+              <a:buFont typeface="Arial" pitchFamily="34" charset="0"/>
+              <a:buChar char="•"/>
+              <a:defRPr sz="1800" kern="1200">
+                <a:solidFill>
+                  <a:schemeClr val="tx1"/>
+                </a:solidFill>
+                <a:latin typeface="+mn-lt"/>
+                <a:ea typeface="+mn-ea"/>
+                <a:cs typeface="+mn-cs"/>
+              </a:defRPr>
+            </a:lvl3pPr>
+            <a:lvl4pPr marL="1600200" indent="-228600" algn="l" defTabSz="914400" rtl="0" eaLnBrk="1" latinLnBrk="0" hangingPunct="1">
+              <a:spcBef>
+                <a:spcPct val="20000"/>
+              </a:spcBef>
+              <a:buClr>
+                <a:schemeClr val="tx2"/>
+              </a:buClr>
+              <a:buFont typeface="Arial" pitchFamily="34" charset="0"/>
+              <a:buChar char="•"/>
+              <a:defRPr sz="1800" kern="1200">
+                <a:solidFill>
+                  <a:schemeClr val="tx1"/>
+                </a:solidFill>
+                <a:latin typeface="+mn-lt"/>
+                <a:ea typeface="+mn-ea"/>
+                <a:cs typeface="+mn-cs"/>
+              </a:defRPr>
+            </a:lvl4pPr>
+            <a:lvl5pPr marL="2057400" indent="-228600" algn="l" defTabSz="914400" rtl="0" eaLnBrk="1" latinLnBrk="0" hangingPunct="1">
+              <a:spcBef>
+                <a:spcPct val="20000"/>
+              </a:spcBef>
+              <a:buClr>
+                <a:schemeClr val="tx2"/>
+              </a:buClr>
+              <a:buFont typeface="Arial" pitchFamily="34" charset="0"/>
+              <a:buChar char="•"/>
+              <a:defRPr sz="1800" kern="1200" baseline="0">
+                <a:solidFill>
+                  <a:schemeClr val="tx1"/>
+                </a:solidFill>
+                <a:latin typeface="+mn-lt"/>
+                <a:ea typeface="+mn-ea"/>
+                <a:cs typeface="+mn-cs"/>
+              </a:defRPr>
+            </a:lvl5pPr>
+            <a:lvl6pPr marL="2514600" indent="-228600" algn="l" defTabSz="914400" rtl="0" eaLnBrk="1" latinLnBrk="0" hangingPunct="1">
+              <a:spcBef>
+                <a:spcPct val="20000"/>
+              </a:spcBef>
+              <a:buClr>
+                <a:schemeClr val="tx2"/>
+              </a:buClr>
+              <a:buFont typeface="Arial" pitchFamily="34" charset="0"/>
+              <a:buChar char="•"/>
+              <a:defRPr sz="1600" kern="1200">
+                <a:solidFill>
+                  <a:schemeClr val="tx1"/>
+                </a:solidFill>
+                <a:latin typeface="+mn-lt"/>
+                <a:ea typeface="+mn-ea"/>
+                <a:cs typeface="+mn-cs"/>
+              </a:defRPr>
+            </a:lvl6pPr>
+            <a:lvl7pPr marL="2971800" indent="-228600" algn="l" defTabSz="914400" rtl="0" eaLnBrk="1" latinLnBrk="0" hangingPunct="1">
+              <a:spcBef>
+                <a:spcPct val="20000"/>
+              </a:spcBef>
+              <a:buClr>
+                <a:schemeClr val="tx2"/>
+              </a:buClr>
+              <a:buFont typeface="Arial" pitchFamily="34" charset="0"/>
+              <a:buChar char="•"/>
+              <a:defRPr sz="1600" kern="1200">
+                <a:solidFill>
+                  <a:schemeClr val="tx1"/>
+                </a:solidFill>
+                <a:latin typeface="+mn-lt"/>
+                <a:ea typeface="+mn-ea"/>
+                <a:cs typeface="+mn-cs"/>
+              </a:defRPr>
+            </a:lvl7pPr>
+            <a:lvl8pPr marL="3429000" indent="-228600" algn="l" defTabSz="914400" rtl="0" eaLnBrk="1" latinLnBrk="0" hangingPunct="1">
+              <a:spcBef>
+                <a:spcPct val="20000"/>
+              </a:spcBef>
+              <a:buClr>
+                <a:schemeClr val="tx2"/>
+              </a:buClr>
+              <a:buFont typeface="Arial" pitchFamily="34" charset="0"/>
+              <a:buChar char="•"/>
+              <a:defRPr sz="1600" kern="1200">
+                <a:solidFill>
+                  <a:schemeClr val="tx1"/>
+                </a:solidFill>
+                <a:latin typeface="+mn-lt"/>
+                <a:ea typeface="+mn-ea"/>
+                <a:cs typeface="+mn-cs"/>
+              </a:defRPr>
+            </a:lvl8pPr>
+            <a:lvl9pPr marL="3886200" indent="-228600" algn="l" defTabSz="914400" rtl="0" eaLnBrk="1" latinLnBrk="0" hangingPunct="1">
+              <a:spcBef>
+                <a:spcPct val="20000"/>
+              </a:spcBef>
+              <a:buClr>
+                <a:schemeClr val="tx2"/>
+              </a:buClr>
+              <a:buFont typeface="Arial" pitchFamily="34" charset="0"/>
+              <a:buChar char="•"/>
+              <a:defRPr sz="1600" kern="1200">
+                <a:solidFill>
+                  <a:schemeClr val="tx1"/>
+                </a:solidFill>
+                <a:latin typeface="+mn-lt"/>
+                <a:ea typeface="+mn-ea"/>
+                <a:cs typeface="+mn-cs"/>
+              </a:defRPr>
+            </a:lvl9pPr>
+          </a:lstStyle>
+          <a:p>
+            <a:pPr marL="285750" indent="-285750">
+              <a:lnSpc>
+                <a:spcPct val="150000"/>
+              </a:lnSpc>
+              <a:buFont typeface="Arial" charset="0"/>
+              <a:buChar char="•"/>
+            </a:pPr>
+            <a:r>
+              <a:rPr lang="fr-CA" sz="1600" dirty="0" smtClean="0">
+                <a:solidFill>
+                  <a:schemeClr val="bg1"/>
+                </a:solidFill>
+              </a:rPr>
+              <a:t>Le mouvement du personnage</a:t>
+            </a:r>
+          </a:p>
+          <a:p>
+            <a:pPr marL="285750" indent="-285750">
+              <a:lnSpc>
+                <a:spcPct val="150000"/>
+              </a:lnSpc>
+              <a:buFont typeface="Arial" charset="0"/>
+              <a:buChar char="•"/>
+            </a:pPr>
+            <a:r>
+              <a:rPr lang="fr-CA" sz="1600" dirty="0" smtClean="0">
+                <a:solidFill>
+                  <a:schemeClr val="bg1"/>
+                </a:solidFill>
+              </a:rPr>
+              <a:t>Le mouvement de la caméra</a:t>
+            </a:r>
+          </a:p>
+          <a:p>
+            <a:pPr marL="285750" indent="-285750">
+              <a:lnSpc>
+                <a:spcPct val="150000"/>
+              </a:lnSpc>
+              <a:buFont typeface="Arial" charset="0"/>
+              <a:buChar char="•"/>
+            </a:pPr>
+            <a:r>
+              <a:rPr lang="fr-CA" sz="1600" dirty="0" smtClean="0">
+                <a:solidFill>
+                  <a:schemeClr val="bg1"/>
+                </a:solidFill>
+              </a:rPr>
+              <a:t>La simplicité du jeu</a:t>
+            </a:r>
+            <a:endParaRPr lang="fr-CA" sz="1600" dirty="0" smtClean="0">
+              <a:solidFill>
+                <a:schemeClr val="accent2"/>
+              </a:solidFill>
+            </a:endParaRPr>
+          </a:p>
+          <a:p>
+            <a:pPr marL="342900" indent="-342900">
+              <a:buFont typeface="Arial" charset="0"/>
+              <a:buChar char="•"/>
+            </a:pPr>
+            <a:endParaRPr lang="fr-CA" sz="1400" b="0" dirty="0">
+              <a:solidFill>
+                <a:schemeClr val="accent2"/>
+              </a:solidFill>
+            </a:endParaRPr>
+          </a:p>
+        </p:txBody>
+      </p:sp>
+      <p:sp>
+        <p:nvSpPr>
+          <p:cNvPr id="10" name="Espace réservé du contenu 2"/>
+          <p:cNvSpPr txBox="1">
+            <a:spLocks/>
+          </p:cNvSpPr>
+          <p:nvPr/>
+        </p:nvSpPr>
+        <p:spPr>
+          <a:xfrm>
+            <a:off x="5166355" y="349431"/>
+            <a:ext cx="3304545" cy="645668"/>
+          </a:xfrm>
+          <a:prstGeom prst="rect">
+            <a:avLst/>
+          </a:prstGeom>
+        </p:spPr>
+        <p:txBody>
+          <a:bodyPr vert="horz" lIns="91440" tIns="45720" rIns="91440" bIns="45720" rtlCol="0">
+            <a:noAutofit/>
+          </a:bodyPr>
+          <a:lstStyle>
+            <a:lvl1pPr marL="0" indent="0" algn="l" defTabSz="914400" rtl="0" eaLnBrk="1" latinLnBrk="0" hangingPunct="1">
+              <a:spcBef>
+                <a:spcPct val="20000"/>
+              </a:spcBef>
+              <a:spcAft>
+                <a:spcPts val="600"/>
+              </a:spcAft>
+              <a:buFont typeface="Arial" pitchFamily="34" charset="0"/>
+              <a:buNone/>
+              <a:defRPr sz="2000" b="1" kern="1200">
+                <a:solidFill>
+                  <a:schemeClr val="tx1"/>
+                </a:solidFill>
+                <a:latin typeface="+mn-lt"/>
+                <a:ea typeface="+mn-ea"/>
+                <a:cs typeface="+mn-cs"/>
+              </a:defRPr>
+            </a:lvl1pPr>
+            <a:lvl2pPr marL="457200" indent="-182880" algn="l" defTabSz="914400" rtl="0" eaLnBrk="1" latinLnBrk="0" hangingPunct="1">
+              <a:spcBef>
+                <a:spcPct val="20000"/>
+              </a:spcBef>
+              <a:buClr>
+                <a:schemeClr val="tx2"/>
+              </a:buClr>
+              <a:buFont typeface="Arial" pitchFamily="34" charset="0"/>
+              <a:buChar char="•"/>
+              <a:defRPr sz="2000" kern="1200">
+                <a:solidFill>
+                  <a:schemeClr val="tx1"/>
+                </a:solidFill>
+                <a:latin typeface="+mn-lt"/>
+                <a:ea typeface="+mn-ea"/>
+                <a:cs typeface="+mn-cs"/>
+              </a:defRPr>
+            </a:lvl2pPr>
+            <a:lvl3pPr marL="1143000" indent="-228600" algn="l" defTabSz="914400" rtl="0" eaLnBrk="1" latinLnBrk="0" hangingPunct="1">
+              <a:spcBef>
+                <a:spcPct val="20000"/>
+              </a:spcBef>
+              <a:buClr>
+                <a:schemeClr val="tx2"/>
+              </a:buClr>
+              <a:buFont typeface="Arial" pitchFamily="34" charset="0"/>
+              <a:buChar char="•"/>
+              <a:defRPr sz="1800" kern="1200">
+                <a:solidFill>
+                  <a:schemeClr val="tx1"/>
+                </a:solidFill>
+                <a:latin typeface="+mn-lt"/>
+                <a:ea typeface="+mn-ea"/>
+                <a:cs typeface="+mn-cs"/>
+              </a:defRPr>
+            </a:lvl3pPr>
+            <a:lvl4pPr marL="1600200" indent="-228600" algn="l" defTabSz="914400" rtl="0" eaLnBrk="1" latinLnBrk="0" hangingPunct="1">
+              <a:spcBef>
+                <a:spcPct val="20000"/>
+              </a:spcBef>
+              <a:buClr>
+                <a:schemeClr val="tx2"/>
+              </a:buClr>
+              <a:buFont typeface="Arial" pitchFamily="34" charset="0"/>
+              <a:buChar char="•"/>
+              <a:defRPr sz="1800" kern="1200">
+                <a:solidFill>
+                  <a:schemeClr val="tx1"/>
+                </a:solidFill>
+                <a:latin typeface="+mn-lt"/>
+                <a:ea typeface="+mn-ea"/>
+                <a:cs typeface="+mn-cs"/>
+              </a:defRPr>
+            </a:lvl4pPr>
+            <a:lvl5pPr marL="2057400" indent="-228600" algn="l" defTabSz="914400" rtl="0" eaLnBrk="1" latinLnBrk="0" hangingPunct="1">
+              <a:spcBef>
+                <a:spcPct val="20000"/>
+              </a:spcBef>
+              <a:buClr>
+                <a:schemeClr val="tx2"/>
+              </a:buClr>
+              <a:buFont typeface="Arial" pitchFamily="34" charset="0"/>
+              <a:buChar char="•"/>
+              <a:defRPr sz="1800" kern="1200" baseline="0">
+                <a:solidFill>
+                  <a:schemeClr val="tx1"/>
+                </a:solidFill>
+                <a:latin typeface="+mn-lt"/>
+                <a:ea typeface="+mn-ea"/>
+                <a:cs typeface="+mn-cs"/>
+              </a:defRPr>
+            </a:lvl5pPr>
+            <a:lvl6pPr marL="2514600" indent="-228600" algn="l" defTabSz="914400" rtl="0" eaLnBrk="1" latinLnBrk="0" hangingPunct="1">
+              <a:spcBef>
+                <a:spcPct val="20000"/>
+              </a:spcBef>
+              <a:buClr>
+                <a:schemeClr val="tx2"/>
+              </a:buClr>
+              <a:buFont typeface="Arial" pitchFamily="34" charset="0"/>
+              <a:buChar char="•"/>
+              <a:defRPr sz="1600" kern="1200">
+                <a:solidFill>
+                  <a:schemeClr val="tx1"/>
+                </a:solidFill>
+                <a:latin typeface="+mn-lt"/>
+                <a:ea typeface="+mn-ea"/>
+                <a:cs typeface="+mn-cs"/>
+              </a:defRPr>
+            </a:lvl6pPr>
+            <a:lvl7pPr marL="2971800" indent="-228600" algn="l" defTabSz="914400" rtl="0" eaLnBrk="1" latinLnBrk="0" hangingPunct="1">
+              <a:spcBef>
+                <a:spcPct val="20000"/>
+              </a:spcBef>
+              <a:buClr>
+                <a:schemeClr val="tx2"/>
+              </a:buClr>
+              <a:buFont typeface="Arial" pitchFamily="34" charset="0"/>
+              <a:buChar char="•"/>
+              <a:defRPr sz="1600" kern="1200">
+                <a:solidFill>
+                  <a:schemeClr val="tx1"/>
+                </a:solidFill>
+                <a:latin typeface="+mn-lt"/>
+                <a:ea typeface="+mn-ea"/>
+                <a:cs typeface="+mn-cs"/>
+              </a:defRPr>
+            </a:lvl7pPr>
+            <a:lvl8pPr marL="3429000" indent="-228600" algn="l" defTabSz="914400" rtl="0" eaLnBrk="1" latinLnBrk="0" hangingPunct="1">
+              <a:spcBef>
+                <a:spcPct val="20000"/>
+              </a:spcBef>
+              <a:buClr>
+                <a:schemeClr val="tx2"/>
+              </a:buClr>
+              <a:buFont typeface="Arial" pitchFamily="34" charset="0"/>
+              <a:buChar char="•"/>
+              <a:defRPr sz="1600" kern="1200">
+                <a:solidFill>
+                  <a:schemeClr val="tx1"/>
+                </a:solidFill>
+                <a:latin typeface="+mn-lt"/>
+                <a:ea typeface="+mn-ea"/>
+                <a:cs typeface="+mn-cs"/>
+              </a:defRPr>
+            </a:lvl8pPr>
+            <a:lvl9pPr marL="3886200" indent="-228600" algn="l" defTabSz="914400" rtl="0" eaLnBrk="1" latinLnBrk="0" hangingPunct="1">
+              <a:spcBef>
+                <a:spcPct val="20000"/>
+              </a:spcBef>
+              <a:buClr>
+                <a:schemeClr val="tx2"/>
+              </a:buClr>
+              <a:buFont typeface="Arial" pitchFamily="34" charset="0"/>
+              <a:buChar char="•"/>
+              <a:defRPr sz="1600" kern="1200">
+                <a:solidFill>
+                  <a:schemeClr val="tx1"/>
+                </a:solidFill>
+                <a:latin typeface="+mn-lt"/>
+                <a:ea typeface="+mn-ea"/>
+                <a:cs typeface="+mn-cs"/>
+              </a:defRPr>
+            </a:lvl9pPr>
+          </a:lstStyle>
+          <a:p>
+            <a:pPr algn="ctr">
+              <a:lnSpc>
+                <a:spcPct val="150000"/>
+              </a:lnSpc>
+            </a:pPr>
+            <a:r>
+              <a:rPr lang="en-US" sz="2800" u="sng" cap="all" dirty="0" smtClean="0">
+                <a:solidFill>
+                  <a:schemeClr val="bg1"/>
+                </a:solidFill>
+              </a:rPr>
+              <a:t>Points </a:t>
+            </a:r>
+            <a:r>
+              <a:rPr lang="en-US" sz="2800" u="sng" cap="all" dirty="0" err="1" smtClean="0">
+                <a:solidFill>
+                  <a:schemeClr val="bg1"/>
+                </a:solidFill>
+              </a:rPr>
+              <a:t>faibles</a:t>
+            </a:r>
+            <a:endParaRPr lang="en-US" sz="2800" u="sng" cap="all" dirty="0">
+              <a:solidFill>
+                <a:schemeClr val="bg1"/>
+              </a:solidFill>
+            </a:endParaRPr>
+          </a:p>
+        </p:txBody>
+      </p:sp>
     </p:spTree>
     <p:extLst>
       <p:ext uri="{BB962C8B-B14F-4D97-AF65-F5344CB8AC3E}">
-        <p14:creationId xmlns:p14="http://schemas.microsoft.com/office/powerpoint/2010/main" val="1078388142"/>
+        <p14:creationId xmlns:p14="http://schemas.microsoft.com/office/powerpoint/2010/main" val="805536998"/>
       </p:ext>
     </p:extLst>
   </p:cSld>
   <p:clrMapOvr>
     <a:masterClrMapping/>
   </p:clrMapOvr>
+  <mc:AlternateContent xmlns:mc="http://schemas.openxmlformats.org/markup-compatibility/2006" xmlns:p14="http://schemas.microsoft.com/office/powerpoint/2010/main">
+    <mc:Choice Requires="p14">
+      <p:transition spd="slow" p14:dur="2000"/>
+    </mc:Choice>
+    <mc:Fallback xmlns="">
+      <p:transition spd="slow"/>
+    </mc:Fallback>
+  </mc:AlternateContent>
   <p:timing>
     <p:tnLst>
       <p:par>
@@ -8004,14 +8531,17 @@
         </p:nvSpPr>
         <p:spPr>
           <a:xfrm>
-            <a:off x="-147918" y="-134471"/>
+            <a:off x="-159493" y="-109071"/>
             <a:ext cx="9426389" cy="5419165"/>
           </a:xfrm>
           <a:prstGeom prst="rect">
             <a:avLst/>
           </a:prstGeom>
           <a:solidFill>
-            <a:schemeClr val="tx2"/>
+            <a:schemeClr val="accent5">
+              <a:lumMod val="20000"/>
+              <a:lumOff val="80000"/>
+            </a:schemeClr>
           </a:solidFill>
           <a:ln>
             <a:noFill/>
@@ -8044,131 +8574,129 @@
       </p:sp>
       <p:sp>
         <p:nvSpPr>
-          <p:cNvPr id="3" name="TextBox 2"/>
-          <p:cNvSpPr txBox="1"/>
-          <p:nvPr/>
-        </p:nvSpPr>
-        <p:spPr>
-          <a:xfrm>
-            <a:off x="2605576" y="2065696"/>
-            <a:ext cx="3919406" cy="1077218"/>
-          </a:xfrm>
-          <a:prstGeom prst="rect">
-            <a:avLst/>
-          </a:prstGeom>
-          <a:noFill/>
-        </p:spPr>
-        <p:txBody>
-          <a:bodyPr wrap="none" rtlCol="0">
-            <a:spAutoFit/>
+          <p:cNvPr id="2" name="Titre 1"/>
+          <p:cNvSpPr>
+            <a:spLocks noGrp="1"/>
+          </p:cNvSpPr>
+          <p:nvPr>
+            <p:ph type="title"/>
+          </p:nvPr>
+        </p:nvSpPr>
+        <p:spPr>
+          <a:xfrm>
+            <a:off x="457198" y="546339"/>
+            <a:ext cx="8119641" cy="660161"/>
+          </a:xfrm>
+        </p:spPr>
+        <p:txBody>
+          <a:bodyPr>
+            <a:normAutofit/>
           </a:bodyPr>
           <a:lstStyle/>
           <a:p>
             <a:pPr algn="ctr"/>
             <a:r>
-              <a:rPr lang="fr-CA" sz="3200" dirty="0" smtClean="0">
+              <a:rPr lang="fr-FR" sz="2800" dirty="0" smtClean="0">
                 <a:solidFill>
-                  <a:schemeClr val="bg1"/>
+                  <a:schemeClr val="tx1"/>
                 </a:solidFill>
-                <a:latin typeface="+mj-lt"/>
               </a:rPr>
-              <a:t>QUESTIONS/</a:t>
-            </a:r>
-          </a:p>
-          <a:p>
-            <a:pPr algn="ctr"/>
-            <a:r>
-              <a:rPr lang="fr-CA" sz="3200" dirty="0" smtClean="0">
-                <a:solidFill>
-                  <a:schemeClr val="bg1"/>
-                </a:solidFill>
-                <a:latin typeface="+mj-lt"/>
+              <a:t>Ressources</a:t>
+            </a:r>
+            <a:endParaRPr lang="fr-FR" sz="2800" dirty="0">
+              <a:solidFill>
+                <a:schemeClr val="tx1"/>
+              </a:solidFill>
+            </a:endParaRPr>
+          </a:p>
+        </p:txBody>
+      </p:sp>
+      <p:sp>
+        <p:nvSpPr>
+          <p:cNvPr id="3" name="Espace réservé du contenu 2"/>
+          <p:cNvSpPr>
+            <a:spLocks noGrp="1"/>
+          </p:cNvSpPr>
+          <p:nvPr>
+            <p:ph idx="1"/>
+          </p:nvPr>
+        </p:nvSpPr>
+        <p:spPr>
+          <a:xfrm>
+            <a:off x="1085987" y="1600199"/>
+            <a:ext cx="3001264" cy="1658097"/>
+          </a:xfrm>
+        </p:spPr>
+        <p:txBody>
+          <a:bodyPr>
+            <a:normAutofit/>
+          </a:bodyPr>
+          <a:lstStyle/>
+          <a:p>
+            <a:pPr marL="285750" indent="-285750">
+              <a:lnSpc>
+                <a:spcPct val="120000"/>
+              </a:lnSpc>
+              <a:buFont typeface="Arial" charset="0"/>
+              <a:buChar char="•"/>
+            </a:pPr>
+            <a:r>
+              <a:rPr lang="fr-FR" sz="1600" b="0" dirty="0" smtClean="0">
+                <a:hlinkClick r:id="rId2"/>
               </a:rPr>
-              <a:t>COMMENTAIRES</a:t>
-            </a:r>
-            <a:endParaRPr lang="fr-CA" sz="3200" dirty="0">
-              <a:solidFill>
-                <a:schemeClr val="bg1"/>
-              </a:solidFill>
-              <a:latin typeface="+mj-lt"/>
-            </a:endParaRPr>
-          </a:p>
-        </p:txBody>
-      </p:sp>
-      <p:cxnSp>
-        <p:nvCxnSpPr>
-          <p:cNvPr id="7" name="Connecteur droit 6"/>
-          <p:cNvCxnSpPr/>
-          <p:nvPr/>
-        </p:nvCxnSpPr>
-        <p:spPr>
-          <a:xfrm>
-            <a:off x="1620456" y="1574157"/>
-            <a:ext cx="5729468" cy="0"/>
-          </a:xfrm>
-          <a:prstGeom prst="line">
-            <a:avLst/>
-          </a:prstGeom>
-          <a:ln>
-            <a:solidFill>
-              <a:schemeClr val="bg1"/>
-            </a:solidFill>
-          </a:ln>
-        </p:spPr>
-        <p:style>
-          <a:lnRef idx="1">
-            <a:schemeClr val="accent1"/>
-          </a:lnRef>
-          <a:fillRef idx="0">
-            <a:schemeClr val="accent1"/>
-          </a:fillRef>
-          <a:effectRef idx="0">
-            <a:schemeClr val="accent1"/>
-          </a:effectRef>
-          <a:fontRef idx="minor">
-            <a:schemeClr val="tx1"/>
-          </a:fontRef>
-        </p:style>
-      </p:cxnSp>
-      <p:cxnSp>
-        <p:nvCxnSpPr>
-          <p:cNvPr id="8" name="Connecteur droit 7"/>
-          <p:cNvCxnSpPr/>
-          <p:nvPr/>
-        </p:nvCxnSpPr>
-        <p:spPr>
-          <a:xfrm>
-            <a:off x="1620456" y="3634452"/>
-            <a:ext cx="5729468" cy="0"/>
-          </a:xfrm>
-          <a:prstGeom prst="line">
-            <a:avLst/>
-          </a:prstGeom>
-          <a:ln>
-            <a:solidFill>
-              <a:schemeClr val="bg1"/>
-            </a:solidFill>
-          </a:ln>
-        </p:spPr>
-        <p:style>
-          <a:lnRef idx="1">
-            <a:schemeClr val="accent1"/>
-          </a:lnRef>
-          <a:fillRef idx="0">
-            <a:schemeClr val="accent1"/>
-          </a:fillRef>
-          <a:effectRef idx="0">
-            <a:schemeClr val="accent1"/>
-          </a:effectRef>
-          <a:fontRef idx="minor">
-            <a:schemeClr val="tx1"/>
-          </a:fontRef>
-        </p:style>
-      </p:cxnSp>
+              <a:t>www.textures.com</a:t>
+            </a:r>
+            <a:endParaRPr lang="fr-FR" sz="1600" b="0" dirty="0" smtClean="0"/>
+          </a:p>
+          <a:p>
+            <a:pPr marL="285750" indent="-285750">
+              <a:lnSpc>
+                <a:spcPct val="120000"/>
+              </a:lnSpc>
+              <a:buFont typeface="Arial" charset="0"/>
+              <a:buChar char="•"/>
+            </a:pPr>
+            <a:r>
+              <a:rPr lang="fr-FR" sz="1600" b="0" dirty="0" err="1" smtClean="0"/>
+              <a:t>AssetStore</a:t>
+            </a:r>
+            <a:r>
+              <a:rPr lang="fr-FR" sz="1600" b="0" dirty="0" smtClean="0"/>
+              <a:t>/</a:t>
+            </a:r>
+            <a:r>
+              <a:rPr lang="fr-FR" sz="1600" b="0" dirty="0" err="1"/>
+              <a:t>U</a:t>
+            </a:r>
+            <a:r>
+              <a:rPr lang="fr-FR" sz="1600" b="0" dirty="0" err="1" smtClean="0"/>
+              <a:t>nity</a:t>
+            </a:r>
+            <a:endParaRPr lang="fr-FR" sz="1600" b="0" dirty="0" smtClean="0"/>
+          </a:p>
+          <a:p>
+            <a:pPr marL="285750" indent="-285750">
+              <a:lnSpc>
+                <a:spcPct val="120000"/>
+              </a:lnSpc>
+              <a:buFont typeface="Arial" charset="0"/>
+              <a:buChar char="•"/>
+            </a:pPr>
+            <a:r>
+              <a:rPr lang="fr-FR" sz="1600" b="0" dirty="0" err="1" smtClean="0"/>
+              <a:t>CrazyBump</a:t>
+            </a:r>
+            <a:endParaRPr lang="fr-FR" sz="1600" b="0" dirty="0"/>
+          </a:p>
+          <a:p>
+            <a:endParaRPr lang="fr-FR" dirty="0"/>
+          </a:p>
+        </p:txBody>
+      </p:sp>
     </p:spTree>
     <p:extLst>
       <p:ext uri="{BB962C8B-B14F-4D97-AF65-F5344CB8AC3E}">
-        <p14:creationId xmlns:p14="http://schemas.microsoft.com/office/powerpoint/2010/main" val="253792094"/>
+        <p14:creationId xmlns:p14="http://schemas.microsoft.com/office/powerpoint/2010/main" val="81220596"/>
       </p:ext>
     </p:extLst>
   </p:cSld>
@@ -8330,15 +8858,7 @@
                   <a:schemeClr val="bg1"/>
                 </a:solidFill>
               </a:rPr>
-              <a:t>Division </a:t>
-            </a:r>
-            <a:r>
-              <a:rPr lang="fr-FR" sz="1400" dirty="0" smtClean="0">
-                <a:solidFill>
-                  <a:schemeClr val="bg1"/>
-                </a:solidFill>
-              </a:rPr>
-              <a:t>des </a:t>
+              <a:t>Division des </a:t>
             </a:r>
             <a:r>
               <a:rPr lang="fr-FR" sz="1400" dirty="0" err="1" smtClean="0">
@@ -8417,11 +8937,6 @@
               </a:rPr>
               <a:t>Modèle</a:t>
             </a:r>
-            <a:endParaRPr lang="fr-FR" sz="1400" dirty="0" smtClean="0">
-              <a:solidFill>
-                <a:schemeClr val="bg1"/>
-              </a:solidFill>
-            </a:endParaRPr>
           </a:p>
           <a:p>
             <a:pPr marL="342900" indent="-342900">
@@ -8584,17 +9099,14 @@
         </p:nvSpPr>
         <p:spPr>
           <a:xfrm>
-            <a:off x="-159493" y="-109071"/>
+            <a:off x="-147918" y="-134471"/>
             <a:ext cx="9426389" cy="5419165"/>
           </a:xfrm>
           <a:prstGeom prst="rect">
             <a:avLst/>
           </a:prstGeom>
           <a:solidFill>
-            <a:schemeClr val="accent5">
-              <a:lumMod val="20000"/>
-              <a:lumOff val="80000"/>
-            </a:schemeClr>
+            <a:schemeClr val="tx2"/>
           </a:solidFill>
           <a:ln>
             <a:noFill/>
@@ -8627,129 +9139,119 @@
       </p:sp>
       <p:sp>
         <p:nvSpPr>
-          <p:cNvPr id="2" name="Titre 1"/>
-          <p:cNvSpPr>
-            <a:spLocks noGrp="1"/>
-          </p:cNvSpPr>
-          <p:nvPr>
-            <p:ph type="title"/>
-          </p:nvPr>
-        </p:nvSpPr>
-        <p:spPr>
-          <a:xfrm>
-            <a:off x="457198" y="546339"/>
-            <a:ext cx="8119641" cy="660161"/>
-          </a:xfrm>
-        </p:spPr>
-        <p:txBody>
-          <a:bodyPr>
-            <a:normAutofit/>
+          <p:cNvPr id="3" name="TextBox 2"/>
+          <p:cNvSpPr txBox="1"/>
+          <p:nvPr/>
+        </p:nvSpPr>
+        <p:spPr>
+          <a:xfrm>
+            <a:off x="3667113" y="2311917"/>
+            <a:ext cx="1796326" cy="584775"/>
+          </a:xfrm>
+          <a:prstGeom prst="rect">
+            <a:avLst/>
+          </a:prstGeom>
+          <a:noFill/>
+        </p:spPr>
+        <p:txBody>
+          <a:bodyPr wrap="none" rtlCol="0">
+            <a:spAutoFit/>
           </a:bodyPr>
           <a:lstStyle/>
           <a:p>
             <a:pPr algn="ctr"/>
             <a:r>
-              <a:rPr lang="fr-FR" sz="2800" dirty="0" smtClean="0">
+              <a:rPr lang="fr-CA" sz="3200" dirty="0" smtClean="0">
                 <a:solidFill>
-                  <a:schemeClr val="tx1"/>
+                  <a:schemeClr val="bg1"/>
                 </a:solidFill>
+                <a:latin typeface="+mj-lt"/>
               </a:rPr>
-              <a:t>Ressources</a:t>
-            </a:r>
-            <a:endParaRPr lang="fr-FR" sz="2800" dirty="0">
+              <a:t>MERCI!</a:t>
+            </a:r>
+            <a:endParaRPr lang="fr-CA" sz="3200" dirty="0">
               <a:solidFill>
-                <a:schemeClr val="tx1"/>
+                <a:schemeClr val="bg1"/>
               </a:solidFill>
+              <a:latin typeface="+mj-lt"/>
             </a:endParaRPr>
           </a:p>
         </p:txBody>
       </p:sp>
-      <p:sp>
-        <p:nvSpPr>
-          <p:cNvPr id="3" name="Espace réservé du contenu 2"/>
-          <p:cNvSpPr>
-            <a:spLocks noGrp="1"/>
-          </p:cNvSpPr>
-          <p:nvPr>
-            <p:ph idx="1"/>
-          </p:nvPr>
-        </p:nvSpPr>
-        <p:spPr>
-          <a:xfrm>
-            <a:off x="1085987" y="1600199"/>
-            <a:ext cx="3001264" cy="1658097"/>
-          </a:xfrm>
-        </p:spPr>
-        <p:txBody>
-          <a:bodyPr>
-            <a:normAutofit/>
-          </a:bodyPr>
-          <a:lstStyle/>
-          <a:p>
-            <a:pPr marL="285750" indent="-285750">
-              <a:lnSpc>
-                <a:spcPct val="120000"/>
-              </a:lnSpc>
-              <a:buFont typeface="Arial" charset="0"/>
-              <a:buChar char="•"/>
-            </a:pPr>
-            <a:r>
-              <a:rPr lang="fr-FR" sz="1600" b="0" dirty="0" smtClean="0">
-                <a:hlinkClick r:id="rId2"/>
-              </a:rPr>
-              <a:t>www.textures.com</a:t>
-            </a:r>
-            <a:endParaRPr lang="fr-FR" sz="1600" b="0" dirty="0" smtClean="0"/>
-          </a:p>
-          <a:p>
-            <a:pPr marL="285750" indent="-285750">
-              <a:lnSpc>
-                <a:spcPct val="120000"/>
-              </a:lnSpc>
-              <a:buFont typeface="Arial" charset="0"/>
-              <a:buChar char="•"/>
-            </a:pPr>
-            <a:r>
-              <a:rPr lang="fr-FR" sz="1600" b="0" dirty="0" err="1" smtClean="0"/>
-              <a:t>AssetStore</a:t>
-            </a:r>
-            <a:r>
-              <a:rPr lang="fr-FR" sz="1600" b="0" dirty="0" smtClean="0"/>
-              <a:t>/</a:t>
-            </a:r>
-            <a:r>
-              <a:rPr lang="fr-FR" sz="1600" b="0" dirty="0" err="1"/>
-              <a:t>U</a:t>
-            </a:r>
-            <a:r>
-              <a:rPr lang="fr-FR" sz="1600" b="0" dirty="0" err="1" smtClean="0"/>
-              <a:t>nity</a:t>
-            </a:r>
-            <a:endParaRPr lang="fr-FR" sz="1600" b="0" dirty="0" smtClean="0"/>
-          </a:p>
-          <a:p>
-            <a:pPr marL="285750" indent="-285750">
-              <a:lnSpc>
-                <a:spcPct val="120000"/>
-              </a:lnSpc>
-              <a:buFont typeface="Arial" charset="0"/>
-              <a:buChar char="•"/>
-            </a:pPr>
-            <a:r>
-              <a:rPr lang="fr-FR" sz="1600" b="0" dirty="0" err="1" smtClean="0"/>
-              <a:t>CrazyBump</a:t>
-            </a:r>
-            <a:endParaRPr lang="fr-FR" sz="1600" b="0" dirty="0"/>
-          </a:p>
-          <a:p>
-            <a:endParaRPr lang="fr-FR" dirty="0"/>
-          </a:p>
-        </p:txBody>
-      </p:sp>
+      <p:cxnSp>
+        <p:nvCxnSpPr>
+          <p:cNvPr id="7" name="Connecteur droit 6"/>
+          <p:cNvCxnSpPr/>
+          <p:nvPr/>
+        </p:nvCxnSpPr>
+        <p:spPr>
+          <a:xfrm>
+            <a:off x="1620456" y="1574157"/>
+            <a:ext cx="5729468" cy="0"/>
+          </a:xfrm>
+          <a:prstGeom prst="line">
+            <a:avLst/>
+          </a:prstGeom>
+          <a:ln>
+            <a:solidFill>
+              <a:schemeClr val="bg1"/>
+            </a:solidFill>
+          </a:ln>
+        </p:spPr>
+        <p:style>
+          <a:lnRef idx="1">
+            <a:schemeClr val="accent1"/>
+          </a:lnRef>
+          <a:fillRef idx="0">
+            <a:schemeClr val="accent1"/>
+          </a:fillRef>
+          <a:effectRef idx="0">
+            <a:schemeClr val="accent1"/>
+          </a:effectRef>
+          <a:fontRef idx="minor">
+            <a:schemeClr val="tx1"/>
+          </a:fontRef>
+        </p:style>
+      </p:cxnSp>
+      <p:cxnSp>
+        <p:nvCxnSpPr>
+          <p:cNvPr id="8" name="Connecteur droit 7"/>
+          <p:cNvCxnSpPr/>
+          <p:nvPr/>
+        </p:nvCxnSpPr>
+        <p:spPr>
+          <a:xfrm>
+            <a:off x="1620456" y="3634452"/>
+            <a:ext cx="5729468" cy="0"/>
+          </a:xfrm>
+          <a:prstGeom prst="line">
+            <a:avLst/>
+          </a:prstGeom>
+          <a:ln>
+            <a:solidFill>
+              <a:schemeClr val="bg1"/>
+            </a:solidFill>
+          </a:ln>
+        </p:spPr>
+        <p:style>
+          <a:lnRef idx="1">
+            <a:schemeClr val="accent1"/>
+          </a:lnRef>
+          <a:fillRef idx="0">
+            <a:schemeClr val="accent1"/>
+          </a:fillRef>
+          <a:effectRef idx="0">
+            <a:schemeClr val="accent1"/>
+          </a:effectRef>
+          <a:fontRef idx="minor">
+            <a:schemeClr val="tx1"/>
+          </a:fontRef>
+        </p:style>
+      </p:cxnSp>
     </p:spTree>
     <p:extLst>
       <p:ext uri="{BB962C8B-B14F-4D97-AF65-F5344CB8AC3E}">
-        <p14:creationId xmlns:p14="http://schemas.microsoft.com/office/powerpoint/2010/main" val="81220596"/>
+        <p14:creationId xmlns:p14="http://schemas.microsoft.com/office/powerpoint/2010/main" val="1078388142"/>
       </p:ext>
     </p:extLst>
   </p:cSld>
@@ -9164,13 +9666,7 @@
               <a:rPr lang="fr-CA" sz="2800" u="sng" dirty="0" smtClean="0">
                 <a:latin typeface="+mj-lt"/>
               </a:rPr>
-              <a:t>STYLE DE JEU </a:t>
-            </a:r>
-            <a:r>
-              <a:rPr lang="fr-CA" sz="2800" u="sng" dirty="0" smtClean="0">
-                <a:latin typeface="+mj-lt"/>
-              </a:rPr>
-              <a:t>UTILISÉ</a:t>
+              <a:t>STYLE DE JEU UTILISÉ</a:t>
             </a:r>
             <a:endParaRPr lang="fr-CA" b="1" u="sng" dirty="0"/>
           </a:p>
@@ -10150,15 +10646,7 @@
                   <a:schemeClr val="bg1"/>
                 </a:solidFill>
               </a:rPr>
-              <a:t>Arbre </a:t>
-            </a:r>
-            <a:r>
-              <a:rPr lang="fr-FR" sz="1600" b="1" dirty="0" smtClean="0">
-                <a:solidFill>
-                  <a:schemeClr val="bg1"/>
-                </a:solidFill>
-              </a:rPr>
-              <a:t>avec une texture </a:t>
+              <a:t>Arbre avec une texture </a:t>
             </a:r>
             <a:r>
               <a:rPr lang="fr-FR" sz="1600" b="1" dirty="0" err="1" smtClean="0">
@@ -10174,15 +10662,7 @@
                   <a:schemeClr val="bg1"/>
                 </a:solidFill>
               </a:rPr>
-              <a:t> </a:t>
-            </a:r>
-            <a:r>
-              <a:rPr lang="fr-FR" sz="1600" b="1" dirty="0" smtClean="0">
-                <a:solidFill>
-                  <a:schemeClr val="bg1"/>
-                </a:solidFill>
-              </a:rPr>
-              <a:t>Die</a:t>
+              <a:t> Die</a:t>
             </a:r>
             <a:endParaRPr lang="fr-FR" sz="1600" dirty="0">
               <a:solidFill>

</xml_diff>